<commit_message>
Site updated: 2020-05-20 01:38:35
</commit_message>
<xml_diff>
--- a/images/github/thumbnail.pptx
+++ b/images/github/thumbnail.pptx
@@ -3588,7 +3588,7 @@
         <p:spPr>
           <a:xfrm>
             <a:off x="4167971" y="4362475"/>
-            <a:ext cx="3845925" cy="646331"/>
+            <a:ext cx="3696846" cy="646331"/>
           </a:xfrm>
           <a:prstGeom prst="rect">
             <a:avLst/>
@@ -3611,13 +3611,13 @@
               <a:t>Github&amp;hexo</a:t>
             </a:r>
             <a:r>
-              <a:rPr lang="en-US" altLang="ko-KR" sz="3600" dirty="0">
+              <a:rPr lang="en-US" altLang="ko-KR" sz="3600">
                 <a:solidFill>
                   <a:schemeClr val="bg1"/>
                 </a:solidFill>
                 <a:latin typeface="Berlin Sans FB" panose="020E0602020502020306" pitchFamily="34" charset="0"/>
               </a:rPr>
-              <a:t> Page</a:t>
+              <a:t> Blog</a:t>
             </a:r>
             <a:endParaRPr lang="ko-KR" altLang="en-US" sz="3600" dirty="0">
               <a:solidFill>

</xml_diff>